<commit_message>
Added two lines of comments in code
The comments are to clarify that the red dots are proportional to the number of BikePoints (or docking stations) in a given location or Borough. This is added on the back of a peer-review.
</commit_message>
<xml_diff>
--- a/Obesity Trends and BikePoint Accessibility in London Boroughs - Presentation Slides.pptx
+++ b/Obesity Trends and BikePoint Accessibility in London Boroughs - Presentation Slides.pptx
@@ -663,7 +663,25 @@
                 <a:ea typeface="Aptos" panose="020B0004020202020204" pitchFamily="34" charset="0"/>
                 <a:cs typeface="Times New Roman" panose="02020603050405020304" pitchFamily="18" charset="0"/>
               </a:rPr>
-              <a:t>The aim of this presentation is to create a minimum viable product to enable decision makers to select optimal sites for new </a:t>
+              <a:t>The aim of this presentation is to create a minimum viable product to enable decision makers, who wants to encourage people </a:t>
+            </a:r>
+            <a:r>
+              <a:rPr lang="en-GB" sz="1800" kern="100">
+                <a:effectLst/>
+                <a:latin typeface="Aptos" panose="020B0004020202020204" pitchFamily="34" charset="0"/>
+                <a:ea typeface="Aptos" panose="020B0004020202020204" pitchFamily="34" charset="0"/>
+                <a:cs typeface="Times New Roman" panose="02020603050405020304" pitchFamily="18" charset="0"/>
+              </a:rPr>
+              <a:t>to exercise, to </a:t>
+            </a:r>
+            <a:r>
+              <a:rPr lang="en-GB" sz="1800" kern="100" dirty="0">
+                <a:effectLst/>
+                <a:latin typeface="Aptos" panose="020B0004020202020204" pitchFamily="34" charset="0"/>
+                <a:ea typeface="Aptos" panose="020B0004020202020204" pitchFamily="34" charset="0"/>
+                <a:cs typeface="Times New Roman" panose="02020603050405020304" pitchFamily="18" charset="0"/>
+              </a:rPr>
+              <a:t>select optimal sites for new </a:t>
             </a:r>
             <a:r>
               <a:rPr lang="en-GB" sz="1800" kern="100" dirty="0" err="1">

</xml_diff>